<commit_message>
[mcp] mcp servers supported and tested
</commit_message>
<xml_diff>
--- a/pptagent/templates/default/source.pptx
+++ b/pptagent/templates/default/source.pptx
@@ -17,8 +17,7 @@
     <p:sldId id="261" r:id="rId11"/>
     <p:sldId id="268" r:id="rId12"/>
     <p:sldId id="262" r:id="rId13"/>
-    <p:sldId id="269" r:id="rId14"/>
-    <p:sldId id="263" r:id="rId15"/>
+    <p:sldId id="263" r:id="rId14"/>
   </p:sldIdLst>
   <p:sldSz cx="12192000" cy="6858000"/>
   <p:notesSz cx="6858000" cy="9144000"/>
@@ -850,7 +849,7 @@
             <a:fld id="{B61BEF0D-F0BB-DE4B-95CE-6DB70DBA9567}" type="datetimeFigureOut">
               <a:rPr lang="en-US" dirty="0"/>
               <a:pPr/>
-              <a:t>3/16/2018</a:t>
+              <a:t>9/23/25</a:t>
             </a:fld>
             <a:endParaRPr lang="en-US" dirty="0"/>
           </a:p>
@@ -904,13 +903,13 @@
   <p:clrMapOvr>
     <a:masterClrMapping/>
   </p:clrMapOvr>
-  <mc:AlternateContent xmlns:mc="http://schemas.openxmlformats.org/markup-compatibility/2006">
-    <mc:Choice xmlns:p14="http://schemas.microsoft.com/office/powerpoint/2010/main" Requires="p14">
+  <mc:AlternateContent xmlns:mc="http://schemas.openxmlformats.org/markup-compatibility/2006" xmlns:p14="http://schemas.microsoft.com/office/powerpoint/2010/main">
+    <mc:Choice Requires="p14">
       <p:transition spd="med" p14:dur="700">
         <p:fade/>
       </p:transition>
     </mc:Choice>
-    <mc:Fallback>
+    <mc:Fallback xmlns="">
       <p:transition spd="med">
         <p:fade/>
       </p:transition>
@@ -1110,7 +1109,7 @@
             <a:fld id="{B61BEF0D-F0BB-DE4B-95CE-6DB70DBA9567}" type="datetimeFigureOut">
               <a:rPr lang="en-US" dirty="0"/>
               <a:pPr/>
-              <a:t>3/16/2018</a:t>
+              <a:t>9/23/25</a:t>
             </a:fld>
             <a:endParaRPr lang="en-US" dirty="0"/>
           </a:p>
@@ -1164,13 +1163,13 @@
   <p:clrMapOvr>
     <a:masterClrMapping/>
   </p:clrMapOvr>
-  <mc:AlternateContent xmlns:mc="http://schemas.openxmlformats.org/markup-compatibility/2006">
-    <mc:Choice xmlns:p14="http://schemas.microsoft.com/office/powerpoint/2010/main" Requires="p14">
+  <mc:AlternateContent xmlns:mc="http://schemas.openxmlformats.org/markup-compatibility/2006" xmlns:p14="http://schemas.microsoft.com/office/powerpoint/2010/main">
+    <mc:Choice Requires="p14">
       <p:transition spd="med" p14:dur="700">
         <p:fade/>
       </p:transition>
     </mc:Choice>
-    <mc:Fallback>
+    <mc:Fallback xmlns="">
       <p:transition spd="med">
         <p:fade/>
       </p:transition>
@@ -1433,7 +1432,7 @@
             <a:fld id="{B61BEF0D-F0BB-DE4B-95CE-6DB70DBA9567}" type="datetimeFigureOut">
               <a:rPr lang="en-US" dirty="0"/>
               <a:pPr/>
-              <a:t>3/16/2018</a:t>
+              <a:t>9/23/25</a:t>
             </a:fld>
             <a:endParaRPr lang="en-US" dirty="0"/>
           </a:p>
@@ -1563,13 +1562,13 @@
   <p:clrMapOvr>
     <a:masterClrMapping/>
   </p:clrMapOvr>
-  <mc:AlternateContent xmlns:mc="http://schemas.openxmlformats.org/markup-compatibility/2006">
-    <mc:Choice xmlns:p14="http://schemas.microsoft.com/office/powerpoint/2010/main" Requires="p14">
+  <mc:AlternateContent xmlns:mc="http://schemas.openxmlformats.org/markup-compatibility/2006" xmlns:p14="http://schemas.microsoft.com/office/powerpoint/2010/main">
+    <mc:Choice Requires="p14">
       <p:transition spd="med" p14:dur="700">
         <p:fade/>
       </p:transition>
     </mc:Choice>
-    <mc:Fallback>
+    <mc:Fallback xmlns="">
       <p:transition spd="med">
         <p:fade/>
       </p:transition>
@@ -1769,7 +1768,7 @@
             <a:fld id="{B61BEF0D-F0BB-DE4B-95CE-6DB70DBA9567}" type="datetimeFigureOut">
               <a:rPr lang="en-US" dirty="0"/>
               <a:pPr/>
-              <a:t>3/16/2018</a:t>
+              <a:t>9/23/25</a:t>
             </a:fld>
             <a:endParaRPr lang="en-US" dirty="0"/>
           </a:p>
@@ -1823,13 +1822,13 @@
   <p:clrMapOvr>
     <a:masterClrMapping/>
   </p:clrMapOvr>
-  <mc:AlternateContent xmlns:mc="http://schemas.openxmlformats.org/markup-compatibility/2006">
-    <mc:Choice xmlns:p14="http://schemas.microsoft.com/office/powerpoint/2010/main" Requires="p14">
+  <mc:AlternateContent xmlns:mc="http://schemas.openxmlformats.org/markup-compatibility/2006" xmlns:p14="http://schemas.microsoft.com/office/powerpoint/2010/main">
+    <mc:Choice Requires="p14">
       <p:transition spd="med" p14:dur="700">
         <p:fade/>
       </p:transition>
     </mc:Choice>
-    <mc:Fallback>
+    <mc:Fallback xmlns="">
       <p:transition spd="med">
         <p:fade/>
       </p:transition>
@@ -2092,7 +2091,7 @@
             <a:fld id="{B61BEF0D-F0BB-DE4B-95CE-6DB70DBA9567}" type="datetimeFigureOut">
               <a:rPr lang="en-US" dirty="0"/>
               <a:pPr/>
-              <a:t>3/16/2018</a:t>
+              <a:t>9/23/25</a:t>
             </a:fld>
             <a:endParaRPr lang="en-US" dirty="0"/>
           </a:p>
@@ -2222,13 +2221,13 @@
   <p:clrMapOvr>
     <a:masterClrMapping/>
   </p:clrMapOvr>
-  <mc:AlternateContent xmlns:mc="http://schemas.openxmlformats.org/markup-compatibility/2006">
-    <mc:Choice xmlns:p14="http://schemas.microsoft.com/office/powerpoint/2010/main" Requires="p14">
+  <mc:AlternateContent xmlns:mc="http://schemas.openxmlformats.org/markup-compatibility/2006" xmlns:p14="http://schemas.microsoft.com/office/powerpoint/2010/main">
+    <mc:Choice Requires="p14">
       <p:transition spd="med" p14:dur="700">
         <p:fade/>
       </p:transition>
     </mc:Choice>
-    <mc:Fallback>
+    <mc:Fallback xmlns="">
       <p:transition spd="med">
         <p:fade/>
       </p:transition>
@@ -2488,7 +2487,7 @@
             <a:fld id="{B61BEF0D-F0BB-DE4B-95CE-6DB70DBA9567}" type="datetimeFigureOut">
               <a:rPr lang="en-US" dirty="0"/>
               <a:pPr/>
-              <a:t>3/16/2018</a:t>
+              <a:t>9/23/25</a:t>
             </a:fld>
             <a:endParaRPr lang="en-US" dirty="0"/>
           </a:p>
@@ -2542,13 +2541,13 @@
   <p:clrMapOvr>
     <a:masterClrMapping/>
   </p:clrMapOvr>
-  <mc:AlternateContent xmlns:mc="http://schemas.openxmlformats.org/markup-compatibility/2006">
-    <mc:Choice xmlns:p14="http://schemas.microsoft.com/office/powerpoint/2010/main" Requires="p14">
+  <mc:AlternateContent xmlns:mc="http://schemas.openxmlformats.org/markup-compatibility/2006" xmlns:p14="http://schemas.microsoft.com/office/powerpoint/2010/main">
+    <mc:Choice Requires="p14">
       <p:transition spd="med" p14:dur="700">
         <p:fade/>
       </p:transition>
     </mc:Choice>
-    <mc:Fallback>
+    <mc:Fallback xmlns="">
       <p:transition spd="med">
         <p:fade/>
       </p:transition>
@@ -2666,7 +2665,7 @@
           <a:p>
             <a:fld id="{55C6B4A9-1611-4792-9094-5F34BCA07E0B}" type="datetimeFigureOut">
               <a:rPr lang="en-US" dirty="0"/>
-              <a:t>3/16/2018</a:t>
+              <a:t>9/23/25</a:t>
             </a:fld>
             <a:endParaRPr lang="en-US" dirty="0"/>
           </a:p>
@@ -2719,13 +2718,13 @@
   <p:clrMapOvr>
     <a:masterClrMapping/>
   </p:clrMapOvr>
-  <mc:AlternateContent xmlns:mc="http://schemas.openxmlformats.org/markup-compatibility/2006">
-    <mc:Choice xmlns:p14="http://schemas.microsoft.com/office/powerpoint/2010/main" Requires="p14">
+  <mc:AlternateContent xmlns:mc="http://schemas.openxmlformats.org/markup-compatibility/2006" xmlns:p14="http://schemas.microsoft.com/office/powerpoint/2010/main">
+    <mc:Choice Requires="p14">
       <p:transition spd="med" p14:dur="700">
         <p:fade/>
       </p:transition>
     </mc:Choice>
-    <mc:Fallback>
+    <mc:Fallback xmlns="">
       <p:transition spd="med">
         <p:fade/>
       </p:transition>
@@ -2854,7 +2853,7 @@
             <a:fld id="{B61BEF0D-F0BB-DE4B-95CE-6DB70DBA9567}" type="datetimeFigureOut">
               <a:rPr lang="en-US" dirty="0"/>
               <a:pPr/>
-              <a:t>3/16/2018</a:t>
+              <a:t>9/23/25</a:t>
             </a:fld>
             <a:endParaRPr lang="en-US" dirty="0"/>
           </a:p>
@@ -2908,13 +2907,13 @@
   <p:clrMapOvr>
     <a:masterClrMapping/>
   </p:clrMapOvr>
-  <mc:AlternateContent xmlns:mc="http://schemas.openxmlformats.org/markup-compatibility/2006">
-    <mc:Choice xmlns:p14="http://schemas.microsoft.com/office/powerpoint/2010/main" Requires="p14">
+  <mc:AlternateContent xmlns:mc="http://schemas.openxmlformats.org/markup-compatibility/2006" xmlns:p14="http://schemas.microsoft.com/office/powerpoint/2010/main">
+    <mc:Choice Requires="p14">
       <p:transition spd="med" p14:dur="700">
         <p:fade/>
       </p:transition>
     </mc:Choice>
-    <mc:Fallback>
+    <mc:Fallback xmlns="">
       <p:transition spd="med">
         <p:fade/>
       </p:transition>
@@ -3039,7 +3038,7 @@
             <a:fld id="{B61BEF0D-F0BB-DE4B-95CE-6DB70DBA9567}" type="datetimeFigureOut">
               <a:rPr lang="en-US" dirty="0"/>
               <a:pPr/>
-              <a:t>3/16/2018</a:t>
+              <a:t>9/23/25</a:t>
             </a:fld>
             <a:endParaRPr lang="en-US" dirty="0"/>
           </a:p>
@@ -3093,13 +3092,13 @@
   <p:clrMapOvr>
     <a:masterClrMapping/>
   </p:clrMapOvr>
-  <mc:AlternateContent xmlns:mc="http://schemas.openxmlformats.org/markup-compatibility/2006">
-    <mc:Choice xmlns:p14="http://schemas.microsoft.com/office/powerpoint/2010/main" Requires="p14">
+  <mc:AlternateContent xmlns:mc="http://schemas.openxmlformats.org/markup-compatibility/2006" xmlns:p14="http://schemas.microsoft.com/office/powerpoint/2010/main">
+    <mc:Choice Requires="p14">
       <p:transition spd="med" p14:dur="700">
         <p:fade/>
       </p:transition>
     </mc:Choice>
-    <mc:Fallback>
+    <mc:Fallback xmlns="">
       <p:transition spd="med">
         <p:fade/>
       </p:transition>
@@ -3295,7 +3294,7 @@
             <a:fld id="{B61BEF0D-F0BB-DE4B-95CE-6DB70DBA9567}" type="datetimeFigureOut">
               <a:rPr lang="en-US" dirty="0"/>
               <a:pPr/>
-              <a:t>3/16/2018</a:t>
+              <a:t>9/23/25</a:t>
             </a:fld>
             <a:endParaRPr lang="en-US" dirty="0"/>
           </a:p>
@@ -3349,13 +3348,13 @@
   <p:clrMapOvr>
     <a:masterClrMapping/>
   </p:clrMapOvr>
-  <mc:AlternateContent xmlns:mc="http://schemas.openxmlformats.org/markup-compatibility/2006">
-    <mc:Choice xmlns:p14="http://schemas.microsoft.com/office/powerpoint/2010/main" Requires="p14">
+  <mc:AlternateContent xmlns:mc="http://schemas.openxmlformats.org/markup-compatibility/2006" xmlns:p14="http://schemas.microsoft.com/office/powerpoint/2010/main">
+    <mc:Choice Requires="p14">
       <p:transition spd="med" p14:dur="700">
         <p:fade/>
       </p:transition>
     </mc:Choice>
-    <mc:Fallback>
+    <mc:Fallback xmlns="">
       <p:transition spd="med">
         <p:fade/>
       </p:transition>
@@ -3535,7 +3534,7 @@
           <a:p>
             <a:fld id="{EB712588-04B1-427B-82EE-E8DB90309F08}" type="datetimeFigureOut">
               <a:rPr lang="en-US" dirty="0"/>
-              <a:t>3/16/2018</a:t>
+              <a:t>9/23/25</a:t>
             </a:fld>
             <a:endParaRPr lang="en-US" dirty="0"/>
           </a:p>
@@ -3588,13 +3587,13 @@
   <p:clrMapOvr>
     <a:masterClrMapping/>
   </p:clrMapOvr>
-  <mc:AlternateContent xmlns:mc="http://schemas.openxmlformats.org/markup-compatibility/2006">
-    <mc:Choice xmlns:p14="http://schemas.microsoft.com/office/powerpoint/2010/main" Requires="p14">
+  <mc:AlternateContent xmlns:mc="http://schemas.openxmlformats.org/markup-compatibility/2006" xmlns:p14="http://schemas.microsoft.com/office/powerpoint/2010/main">
+    <mc:Choice Requires="p14">
       <p:transition spd="med" p14:dur="700">
         <p:fade/>
       </p:transition>
     </mc:Choice>
-    <mc:Fallback>
+    <mc:Fallback xmlns="">
       <p:transition spd="med">
         <p:fade/>
       </p:transition>
@@ -3917,7 +3916,7 @@
             <a:fld id="{B61BEF0D-F0BB-DE4B-95CE-6DB70DBA9567}" type="datetimeFigureOut">
               <a:rPr lang="en-US" dirty="0"/>
               <a:pPr/>
-              <a:t>3/16/2018</a:t>
+              <a:t>9/23/25</a:t>
             </a:fld>
             <a:endParaRPr lang="en-US" dirty="0"/>
           </a:p>
@@ -3971,13 +3970,13 @@
   <p:clrMapOvr>
     <a:masterClrMapping/>
   </p:clrMapOvr>
-  <mc:AlternateContent xmlns:mc="http://schemas.openxmlformats.org/markup-compatibility/2006">
-    <mc:Choice xmlns:p14="http://schemas.microsoft.com/office/powerpoint/2010/main" Requires="p14">
+  <mc:AlternateContent xmlns:mc="http://schemas.openxmlformats.org/markup-compatibility/2006" xmlns:p14="http://schemas.microsoft.com/office/powerpoint/2010/main">
+    <mc:Choice Requires="p14">
       <p:transition spd="med" p14:dur="700">
         <p:fade/>
       </p:transition>
     </mc:Choice>
-    <mc:Fallback>
+    <mc:Fallback xmlns="">
       <p:transition spd="med">
         <p:fade/>
       </p:transition>
@@ -4049,7 +4048,7 @@
             <a:fld id="{B61BEF0D-F0BB-DE4B-95CE-6DB70DBA9567}" type="datetimeFigureOut">
               <a:rPr lang="en-US" dirty="0"/>
               <a:pPr/>
-              <a:t>3/16/2018</a:t>
+              <a:t>9/23/25</a:t>
             </a:fld>
             <a:endParaRPr lang="en-US" dirty="0"/>
           </a:p>
@@ -4103,13 +4102,13 @@
   <p:clrMapOvr>
     <a:masterClrMapping/>
   </p:clrMapOvr>
-  <mc:AlternateContent xmlns:mc="http://schemas.openxmlformats.org/markup-compatibility/2006">
-    <mc:Choice xmlns:p14="http://schemas.microsoft.com/office/powerpoint/2010/main" Requires="p14">
+  <mc:AlternateContent xmlns:mc="http://schemas.openxmlformats.org/markup-compatibility/2006" xmlns:p14="http://schemas.microsoft.com/office/powerpoint/2010/main">
+    <mc:Choice Requires="p14">
       <p:transition spd="med" p14:dur="700">
         <p:fade/>
       </p:transition>
     </mc:Choice>
-    <mc:Fallback>
+    <mc:Fallback xmlns="">
       <p:transition spd="med">
         <p:fade/>
       </p:transition>
@@ -4153,7 +4152,7 @@
             <a:fld id="{B61BEF0D-F0BB-DE4B-95CE-6DB70DBA9567}" type="datetimeFigureOut">
               <a:rPr lang="en-US" dirty="0"/>
               <a:pPr/>
-              <a:t>3/16/2018</a:t>
+              <a:t>9/23/25</a:t>
             </a:fld>
             <a:endParaRPr lang="en-US" dirty="0"/>
           </a:p>
@@ -4207,13 +4206,13 @@
   <p:clrMapOvr>
     <a:masterClrMapping/>
   </p:clrMapOvr>
-  <mc:AlternateContent xmlns:mc="http://schemas.openxmlformats.org/markup-compatibility/2006">
-    <mc:Choice xmlns:p14="http://schemas.microsoft.com/office/powerpoint/2010/main" Requires="p14">
+  <mc:AlternateContent xmlns:mc="http://schemas.openxmlformats.org/markup-compatibility/2006" xmlns:p14="http://schemas.microsoft.com/office/powerpoint/2010/main">
+    <mc:Choice Requires="p14">
       <p:transition spd="med" p14:dur="700">
         <p:fade/>
       </p:transition>
     </mc:Choice>
-    <mc:Fallback>
+    <mc:Fallback xmlns="">
       <p:transition spd="med">
         <p:fade/>
       </p:transition>
@@ -4416,7 +4415,7 @@
           <a:p>
             <a:fld id="{42A54C80-263E-416B-A8E0-580EDEADCBDC}" type="datetimeFigureOut">
               <a:rPr lang="en-US" dirty="0"/>
-              <a:t>3/16/2018</a:t>
+              <a:t>9/23/25</a:t>
             </a:fld>
             <a:endParaRPr lang="en-US" dirty="0"/>
           </a:p>
@@ -4469,13 +4468,13 @@
   <p:clrMapOvr>
     <a:masterClrMapping/>
   </p:clrMapOvr>
-  <mc:AlternateContent xmlns:mc="http://schemas.openxmlformats.org/markup-compatibility/2006">
-    <mc:Choice xmlns:p14="http://schemas.microsoft.com/office/powerpoint/2010/main" Requires="p14">
+  <mc:AlternateContent xmlns:mc="http://schemas.openxmlformats.org/markup-compatibility/2006" xmlns:p14="http://schemas.microsoft.com/office/powerpoint/2010/main">
+    <mc:Choice Requires="p14">
       <p:transition spd="med" p14:dur="700">
         <p:fade/>
       </p:transition>
     </mc:Choice>
-    <mc:Fallback>
+    <mc:Fallback xmlns="">
       <p:transition spd="med">
         <p:fade/>
       </p:transition>
@@ -4687,7 +4686,7 @@
             <a:fld id="{B61BEF0D-F0BB-DE4B-95CE-6DB70DBA9567}" type="datetimeFigureOut">
               <a:rPr lang="en-US" dirty="0"/>
               <a:pPr/>
-              <a:t>3/16/2018</a:t>
+              <a:t>9/23/25</a:t>
             </a:fld>
             <a:endParaRPr lang="en-US" dirty="0"/>
           </a:p>
@@ -4741,13 +4740,13 @@
   <p:clrMapOvr>
     <a:masterClrMapping/>
   </p:clrMapOvr>
-  <mc:AlternateContent xmlns:mc="http://schemas.openxmlformats.org/markup-compatibility/2006">
-    <mc:Choice xmlns:p14="http://schemas.microsoft.com/office/powerpoint/2010/main" Requires="p14">
+  <mc:AlternateContent xmlns:mc="http://schemas.openxmlformats.org/markup-compatibility/2006" xmlns:p14="http://schemas.microsoft.com/office/powerpoint/2010/main">
+    <mc:Choice Requires="p14">
       <p:transition spd="med" p14:dur="700">
         <p:fade/>
       </p:transition>
     </mc:Choice>
-    <mc:Fallback>
+    <mc:Fallback xmlns="">
       <p:transition spd="med">
         <p:fade/>
       </p:transition>
@@ -5441,7 +5440,7 @@
             <a:fld id="{B61BEF0D-F0BB-DE4B-95CE-6DB70DBA9567}" type="datetimeFigureOut">
               <a:rPr lang="en-US" dirty="0"/>
               <a:pPr/>
-              <a:t>3/16/2018</a:t>
+              <a:t>9/23/25</a:t>
             </a:fld>
             <a:endParaRPr lang="en-US" dirty="0"/>
           </a:p>
@@ -5545,13 +5544,13 @@
     <p:sldLayoutId id="2147483667" r:id="rId15"/>
     <p:sldLayoutId id="2147483659" r:id="rId16"/>
   </p:sldLayoutIdLst>
-  <mc:AlternateContent xmlns:mc="http://schemas.openxmlformats.org/markup-compatibility/2006">
-    <mc:Choice xmlns:p14="http://schemas.microsoft.com/office/powerpoint/2010/main" Requires="p14">
+  <mc:AlternateContent xmlns:mc="http://schemas.openxmlformats.org/markup-compatibility/2006" xmlns:p14="http://schemas.microsoft.com/office/powerpoint/2010/main">
+    <mc:Choice Requires="p14">
       <p:transition spd="med" p14:dur="700">
         <p:fade/>
       </p:transition>
     </mc:Choice>
-    <mc:Fallback>
+    <mc:Fallback xmlns="">
       <p:transition spd="med">
         <p:fade/>
       </p:transition>
@@ -5991,18 +5990,13 @@
         </p:nvSpPr>
         <p:spPr/>
         <p:txBody>
-          <a:bodyPr/>
+          <a:bodyPr anchor="ctr"/>
           <a:lstStyle/>
           <a:p>
             <a:r>
               <a:rPr lang="en-IN" dirty="0"/>
-              <a:t>Tourism </a:t>
-            </a:r>
-            <a:r>
-              <a:rPr lang="en-IN"/>
-              <a:t>&amp; Culture:</a:t>
-            </a:r>
-            <a:endParaRPr lang="en-IN" dirty="0"/>
+              <a:t>Tourism &amp; Culture:</a:t>
+            </a:r>
           </a:p>
         </p:txBody>
       </p:sp>
@@ -6029,7 +6023,7 @@
           </a:xfrm>
         </p:spPr>
         <p:txBody>
-          <a:bodyPr>
+          <a:bodyPr anchor="ctr">
             <a:normAutofit/>
           </a:bodyPr>
           <a:lstStyle/>
@@ -6093,13 +6087,13 @@
   <p:clrMapOvr>
     <a:masterClrMapping/>
   </p:clrMapOvr>
-  <mc:AlternateContent xmlns:mc="http://schemas.openxmlformats.org/markup-compatibility/2006">
-    <mc:Choice xmlns:p14="http://schemas.microsoft.com/office/powerpoint/2010/main" Requires="p14">
+  <mc:AlternateContent xmlns:mc="http://schemas.openxmlformats.org/markup-compatibility/2006" xmlns:p14="http://schemas.microsoft.com/office/powerpoint/2010/main">
+    <mc:Choice Requires="p14">
       <p:transition spd="med" p14:dur="700">
         <p:fade/>
       </p:transition>
     </mc:Choice>
-    <mc:Fallback>
+    <mc:Fallback xmlns="">
       <p:transition spd="med">
         <p:fade/>
       </p:transition>
@@ -6143,12 +6137,12 @@
         </p:nvSpPr>
         <p:spPr>
           <a:xfrm>
-            <a:off x="677334" y="309563"/>
+            <a:off x="677334" y="32226"/>
             <a:ext cx="8596668" cy="1320800"/>
           </a:xfrm>
         </p:spPr>
         <p:txBody>
-          <a:bodyPr/>
+          <a:bodyPr anchor="ctr"/>
           <a:lstStyle/>
           <a:p>
             <a:pPr algn="ctr"/>
@@ -6184,12 +6178,12 @@
         </p:nvSpPr>
         <p:spPr>
           <a:xfrm>
-            <a:off x="677334" y="1630363"/>
-            <a:ext cx="8596668" cy="5084762"/>
+            <a:off x="677334" y="1353027"/>
+            <a:ext cx="8596668" cy="1766478"/>
           </a:xfrm>
         </p:spPr>
         <p:txBody>
-          <a:bodyPr>
+          <a:bodyPr anchor="ctr">
             <a:noAutofit/>
           </a:bodyPr>
           <a:lstStyle/>
@@ -6350,13 +6344,13 @@
   <p:clrMapOvr>
     <a:masterClrMapping/>
   </p:clrMapOvr>
-  <mc:AlternateContent xmlns:mc="http://schemas.openxmlformats.org/markup-compatibility/2006">
-    <mc:Choice xmlns:p14="http://schemas.microsoft.com/office/powerpoint/2010/main" Requires="p14">
+  <mc:AlternateContent xmlns:mc="http://schemas.openxmlformats.org/markup-compatibility/2006" xmlns:p14="http://schemas.microsoft.com/office/powerpoint/2010/main">
+    <mc:Choice Requires="p14">
       <p:transition spd="med" p14:dur="700">
         <p:fade/>
       </p:transition>
     </mc:Choice>
-    <mc:Fallback>
+    <mc:Fallback xmlns="">
       <p:transition spd="med">
         <p:fade/>
       </p:transition>
@@ -6425,13 +6419,13 @@
         </p:nvSpPr>
         <p:spPr>
           <a:xfrm>
-            <a:off x="4749449" y="276225"/>
-            <a:ext cx="4723341" cy="6557963"/>
+            <a:off x="4975668" y="276225"/>
+            <a:ext cx="4723341" cy="5972175"/>
           </a:xfrm>
         </p:spPr>
         <p:txBody>
-          <a:bodyPr>
-            <a:normAutofit fontScale="92500" lnSpcReduction="10000"/>
+          <a:bodyPr anchor="ctr">
+            <a:normAutofit fontScale="92500" lnSpcReduction="20000"/>
           </a:bodyPr>
           <a:lstStyle/>
           <a:p>
@@ -6637,13 +6631,13 @@
   <p:clrMapOvr>
     <a:masterClrMapping/>
   </p:clrMapOvr>
-  <mc:AlternateContent xmlns:mc="http://schemas.openxmlformats.org/markup-compatibility/2006">
-    <mc:Choice xmlns:p14="http://schemas.microsoft.com/office/powerpoint/2010/main" Requires="p14">
+  <mc:AlternateContent xmlns:mc="http://schemas.openxmlformats.org/markup-compatibility/2006" xmlns:p14="http://schemas.microsoft.com/office/powerpoint/2010/main">
+    <mc:Choice Requires="p14">
       <p:transition spd="med" p14:dur="700">
         <p:fade/>
       </p:transition>
     </mc:Choice>
-    <mc:Fallback>
+    <mc:Fallback xmlns="">
       <p:transition spd="med">
         <p:fade/>
       </p:transition>
@@ -6687,17 +6681,17 @@
         </p:nvSpPr>
         <p:spPr>
           <a:xfrm>
-            <a:off x="1352603" y="271463"/>
-            <a:ext cx="8596668" cy="1320800"/>
+            <a:off x="5165161" y="271463"/>
+            <a:ext cx="5543479" cy="1320800"/>
           </a:xfrm>
         </p:spPr>
         <p:txBody>
-          <a:bodyPr>
+          <a:bodyPr anchor="ctr">
             <a:normAutofit/>
           </a:bodyPr>
           <a:lstStyle/>
           <a:p>
-            <a:pPr algn="r"/>
+            <a:pPr algn="ctr"/>
             <a:r>
               <a:rPr lang="en-IN" sz="4000" dirty="0"/>
               <a:t>The Connecting Link</a:t>
@@ -6723,13 +6717,13 @@
         </p:nvSpPr>
         <p:spPr>
           <a:xfrm>
-            <a:off x="4857750" y="1200150"/>
-            <a:ext cx="4544839" cy="5657850"/>
+            <a:off x="5375910" y="1665640"/>
+            <a:ext cx="4544839" cy="5056628"/>
           </a:xfrm>
         </p:spPr>
         <p:txBody>
-          <a:bodyPr>
-            <a:normAutofit fontScale="85000" lnSpcReduction="20000"/>
+          <a:bodyPr anchor="ctr">
+            <a:normAutofit fontScale="77500" lnSpcReduction="20000"/>
           </a:bodyPr>
           <a:lstStyle/>
           <a:p>
@@ -6796,9 +6790,6 @@
               </a:rPr>
               <a:t>Thus, the dancer, while in the dance akin to yoga, seeks the sacred temple within.</a:t>
             </a:r>
-          </a:p>
-          <a:p>
-            <a:endParaRPr lang="en-IN" dirty="0"/>
           </a:p>
         </p:txBody>
       </p:sp>
@@ -6854,13 +6845,13 @@
   <p:clrMapOvr>
     <a:masterClrMapping/>
   </p:clrMapOvr>
-  <mc:AlternateContent xmlns:mc="http://schemas.openxmlformats.org/markup-compatibility/2006">
-    <mc:Choice xmlns:p14="http://schemas.microsoft.com/office/powerpoint/2010/main" Requires="p14">
+  <mc:AlternateContent xmlns:mc="http://schemas.openxmlformats.org/markup-compatibility/2006" xmlns:p14="http://schemas.microsoft.com/office/powerpoint/2010/main">
+    <mc:Choice Requires="p14">
       <p:transition spd="med" p14:dur="700">
         <p:fade/>
       </p:transition>
     </mc:Choice>
-    <mc:Fallback>
+    <mc:Fallback xmlns="">
       <p:transition spd="med">
         <p:fade/>
       </p:transition>
@@ -6891,284 +6882,6 @@
           <p:cNvPr id="2" name="Title 1">
             <a:extLst>
               <a:ext uri="{FF2B5EF4-FFF2-40B4-BE49-F238E27FC236}">
-                <a16:creationId xmlns:a16="http://schemas.microsoft.com/office/drawing/2014/main" id="{03231965-45C5-4ADC-8C25-F0C39DE9F0E4}"/>
-              </a:ext>
-            </a:extLst>
-          </p:cNvPr>
-          <p:cNvSpPr>
-            <a:spLocks noGrp="1"/>
-          </p:cNvSpPr>
-          <p:nvPr>
-            <p:ph type="title"/>
-          </p:nvPr>
-        </p:nvSpPr>
-        <p:spPr>
-          <a:xfrm>
-            <a:off x="400050" y="78581"/>
-            <a:ext cx="9329737" cy="6700838"/>
-          </a:xfrm>
-        </p:spPr>
-        <p:txBody>
-          <a:bodyPr>
-            <a:noAutofit/>
-          </a:bodyPr>
-          <a:lstStyle/>
-          <a:p>
-            <a:r>
-              <a:rPr lang="en-IN" sz="1800" dirty="0"/>
-              <a:t>The practice of Indian classical dance, like meditation, tames and purifies the external </a:t>
-            </a:r>
-            <a:r>
-              <a:rPr lang="en-IN" sz="1800" dirty="0" err="1"/>
-              <a:t>Sthula-Sharira</a:t>
-            </a:r>
-            <a:r>
-              <a:rPr lang="en-IN" sz="1800" dirty="0"/>
-              <a:t> (the body composed of fluid, with humours and saps, as also of the bones, muscles and vital vulnerable junctures) as it quiets and balances the body’s three humours (</a:t>
-            </a:r>
-            <a:r>
-              <a:rPr lang="en-IN" sz="1800" dirty="0" err="1"/>
-              <a:t>tridosha</a:t>
-            </a:r>
-            <a:r>
-              <a:rPr lang="en-IN" sz="1800" dirty="0"/>
-              <a:t>, </a:t>
-            </a:r>
-            <a:r>
-              <a:rPr lang="en-IN" sz="1800" dirty="0" err="1"/>
-              <a:t>tridhaatu</a:t>
-            </a:r>
-            <a:r>
-              <a:rPr lang="en-IN" sz="1800" dirty="0"/>
-              <a:t>) – wind (</a:t>
-            </a:r>
-            <a:r>
-              <a:rPr lang="en-IN" sz="1800" dirty="0" err="1"/>
-              <a:t>vata</a:t>
-            </a:r>
-            <a:r>
-              <a:rPr lang="en-IN" sz="1800" dirty="0"/>
-              <a:t>), phlegm (</a:t>
-            </a:r>
-            <a:r>
-              <a:rPr lang="en-IN" sz="1800" dirty="0" err="1"/>
-              <a:t>kapha</a:t>
-            </a:r>
-            <a:r>
-              <a:rPr lang="en-IN" sz="1800" dirty="0"/>
-              <a:t>) and fire (pitta). Eventually the dancer should begin to discover the </a:t>
-            </a:r>
-            <a:r>
-              <a:rPr lang="en-IN" sz="1800" dirty="0" err="1"/>
-              <a:t>Suksma</a:t>
-            </a:r>
-            <a:r>
-              <a:rPr lang="en-IN" sz="1800" dirty="0"/>
-              <a:t> </a:t>
-            </a:r>
-            <a:r>
-              <a:rPr lang="en-IN" sz="1800" dirty="0" err="1"/>
-              <a:t>Sharira</a:t>
-            </a:r>
-            <a:r>
-              <a:rPr lang="en-IN" sz="1800" dirty="0"/>
-              <a:t> (the subtle, metaphysical interior body) within her which articulates the psycho-spiritual experiences similar to those of the yogi and the pilgrim or devotee visiting the temple. This subtle body, most often identified with Kundalini Yoga, is defined by one of the many scholars as “ an invisible mandala formed by a combination of symbolic (but also very real) geometric figures” and often depicted as a microcosm of the universe, with the Shiva Samhita noting, “All the beings that exist in the three worlds are also to be found in the subtle body”. Rightly, it is called the seat of the </a:t>
-            </a:r>
-            <a:r>
-              <a:rPr lang="en-IN" sz="1800" dirty="0" err="1"/>
-              <a:t>Atma</a:t>
-            </a:r>
-            <a:r>
-              <a:rPr lang="en-IN" sz="1800" dirty="0"/>
-              <a:t> or soul. </a:t>
-            </a:r>
-            <a:br>
-              <a:rPr lang="en-IN" sz="1800" dirty="0"/>
-            </a:br>
-            <a:r>
-              <a:rPr lang="en-IN" sz="1800" dirty="0"/>
-              <a:t>And the discovery of this subtle body is made possible by the awakening of the vital Kundalini energy within the dancer’s body through the practise and performance of the </a:t>
-            </a:r>
-            <a:r>
-              <a:rPr lang="en-IN" sz="1800" dirty="0" err="1"/>
-              <a:t>Odissi</a:t>
-            </a:r>
-            <a:r>
-              <a:rPr lang="en-IN" sz="1800" dirty="0"/>
-              <a:t> repertoire wherein the dancer begins with </a:t>
-            </a:r>
-            <a:r>
-              <a:rPr lang="en-IN" sz="1800" dirty="0" err="1"/>
-              <a:t>Mangalacharan</a:t>
-            </a:r>
-            <a:r>
-              <a:rPr lang="en-IN" sz="1800" dirty="0"/>
-              <a:t>, an invocation at the entrance to the temple, proceeds to </a:t>
-            </a:r>
-            <a:r>
-              <a:rPr lang="en-IN" sz="1800" dirty="0" err="1"/>
-              <a:t>circumambulate</a:t>
-            </a:r>
-            <a:r>
-              <a:rPr lang="en-IN" sz="1800" dirty="0"/>
-              <a:t> the temple structure depicting the exquisite physical beauty of the numerous postures in various </a:t>
-            </a:r>
-            <a:r>
-              <a:rPr lang="en-IN" sz="1800" dirty="0" err="1"/>
-              <a:t>bhangi</a:t>
-            </a:r>
-            <a:r>
-              <a:rPr lang="en-IN" sz="1800" dirty="0"/>
-              <a:t>-s sculpted on the temple walls through </a:t>
-            </a:r>
-            <a:r>
-              <a:rPr lang="en-IN" sz="1800" dirty="0" err="1"/>
-              <a:t>Batu</a:t>
-            </a:r>
-            <a:r>
-              <a:rPr lang="en-IN" sz="1800" dirty="0"/>
-              <a:t>, then advancing through the </a:t>
-            </a:r>
-            <a:r>
-              <a:rPr lang="en-IN" sz="1800" dirty="0" err="1"/>
-              <a:t>Natya</a:t>
-            </a:r>
-            <a:r>
-              <a:rPr lang="en-IN" sz="1800" dirty="0"/>
-              <a:t> Mandapa with the joyous Pallavi, enters the </a:t>
-            </a:r>
-            <a:r>
-              <a:rPr lang="en-IN" sz="1800" dirty="0" err="1"/>
-              <a:t>Garbha</a:t>
-            </a:r>
-            <a:r>
-              <a:rPr lang="en-IN" sz="1800" dirty="0"/>
-              <a:t> </a:t>
-            </a:r>
-            <a:r>
-              <a:rPr lang="en-IN" sz="1800" dirty="0" err="1"/>
-              <a:t>griha</a:t>
-            </a:r>
-            <a:r>
-              <a:rPr lang="en-IN" sz="1800" dirty="0"/>
-              <a:t> with the self-reflective Abhinaya, an </a:t>
-            </a:r>
-            <a:r>
-              <a:rPr lang="en-IN" sz="1800" dirty="0" err="1"/>
-              <a:t>Ashatapadi</a:t>
-            </a:r>
-            <a:r>
-              <a:rPr lang="en-IN" sz="1800" dirty="0"/>
-              <a:t> wherein she is in private conversation with her Lord, finally leading to </a:t>
-            </a:r>
-            <a:r>
-              <a:rPr lang="en-IN" sz="1800" dirty="0" err="1"/>
-              <a:t>Moshya</a:t>
-            </a:r>
-            <a:r>
-              <a:rPr lang="en-IN" sz="1800" dirty="0"/>
-              <a:t> Nata, the dance of liberation. Thus, the repertoire leads the dancer from collective external consciousness to singular internal consciousness such that in </a:t>
-            </a:r>
-            <a:r>
-              <a:rPr lang="en-IN" sz="1800" dirty="0" err="1"/>
-              <a:t>Mokshya</a:t>
-            </a:r>
-            <a:r>
-              <a:rPr lang="en-IN" sz="1800" dirty="0"/>
-              <a:t> Nata a moment of absolute peace and stillness is reached when the dancer is in total union while in movement with her </a:t>
-            </a:r>
-            <a:r>
-              <a:rPr lang="en-IN" sz="1800" dirty="0" err="1"/>
-              <a:t>Atma</a:t>
-            </a:r>
-            <a:r>
-              <a:rPr lang="en-IN" sz="1800" dirty="0"/>
-              <a:t> or soul within. </a:t>
-            </a:r>
-            <a:br>
-              <a:rPr lang="en-IN" sz="1600" dirty="0"/>
-            </a:br>
-            <a:endParaRPr lang="en-IN" sz="1600" dirty="0"/>
-          </a:p>
-        </p:txBody>
-      </p:sp>
-      <p:sp>
-        <p:nvSpPr>
-          <p:cNvPr id="3" name="Content Placeholder 2">
-            <a:extLst>
-              <a:ext uri="{FF2B5EF4-FFF2-40B4-BE49-F238E27FC236}">
-                <a16:creationId xmlns:a16="http://schemas.microsoft.com/office/drawing/2014/main" id="{B07275F9-BCC7-42E8-A6AB-DB0ECD77CCFE}"/>
-              </a:ext>
-            </a:extLst>
-          </p:cNvPr>
-          <p:cNvSpPr>
-            <a:spLocks noGrp="1"/>
-          </p:cNvSpPr>
-          <p:nvPr>
-            <p:ph idx="1"/>
-          </p:nvPr>
-        </p:nvSpPr>
-        <p:spPr>
-          <a:xfrm flipV="1">
-            <a:off x="1" y="7427250"/>
-            <a:ext cx="3714750" cy="1459575"/>
-          </a:xfrm>
-        </p:spPr>
-        <p:txBody>
-          <a:bodyPr/>
-          <a:lstStyle/>
-          <a:p>
-            <a:endParaRPr lang="en-IN" dirty="0"/>
-          </a:p>
-        </p:txBody>
-      </p:sp>
-    </p:spTree>
-    <p:extLst>
-      <p:ext uri="{BB962C8B-B14F-4D97-AF65-F5344CB8AC3E}">
-        <p14:creationId xmlns:p14="http://schemas.microsoft.com/office/powerpoint/2010/main" val="1786912747"/>
-      </p:ext>
-    </p:extLst>
-  </p:cSld>
-  <p:clrMapOvr>
-    <a:masterClrMapping/>
-  </p:clrMapOvr>
-  <mc:AlternateContent xmlns:mc="http://schemas.openxmlformats.org/markup-compatibility/2006">
-    <mc:Choice xmlns:p14="http://schemas.microsoft.com/office/powerpoint/2010/main" Requires="p14">
-      <p:transition spd="med" p14:dur="700">
-        <p:fade/>
-      </p:transition>
-    </mc:Choice>
-    <mc:Fallback>
-      <p:transition spd="med">
-        <p:fade/>
-      </p:transition>
-    </mc:Fallback>
-  </mc:AlternateContent>
-</p:sld>
-</file>
-
-<file path=ppt/slides/slide14.xml><?xml version="1.0" encoding="utf-8"?>
-<p:sld xmlns:a="http://schemas.openxmlformats.org/drawingml/2006/main" xmlns:r="http://schemas.openxmlformats.org/officeDocument/2006/relationships" xmlns:p="http://schemas.openxmlformats.org/presentationml/2006/main">
-  <p:cSld>
-    <p:spTree>
-      <p:nvGrpSpPr>
-        <p:cNvPr id="1" name=""/>
-        <p:cNvGrpSpPr/>
-        <p:nvPr/>
-      </p:nvGrpSpPr>
-      <p:grpSpPr>
-        <a:xfrm>
-          <a:off x="0" y="0"/>
-          <a:ext cx="0" cy="0"/>
-          <a:chOff x="0" y="0"/>
-          <a:chExt cx="0" cy="0"/>
-        </a:xfrm>
-      </p:grpSpPr>
-      <p:sp>
-        <p:nvSpPr>
-          <p:cNvPr id="2" name="Title 1">
-            <a:extLst>
-              <a:ext uri="{FF2B5EF4-FFF2-40B4-BE49-F238E27FC236}">
                 <a16:creationId xmlns:a16="http://schemas.microsoft.com/office/drawing/2014/main" id="{681FCB56-235C-408C-9DC7-10D03944A3A5}"/>
               </a:ext>
             </a:extLst>
@@ -7187,7 +6900,7 @@
           </a:xfrm>
         </p:spPr>
         <p:txBody>
-          <a:bodyPr/>
+          <a:bodyPr anchor="ctr"/>
           <a:lstStyle/>
           <a:p>
             <a:r>
@@ -7220,7 +6933,7 @@
           </a:xfrm>
         </p:spPr>
         <p:txBody>
-          <a:bodyPr>
+          <a:bodyPr anchor="ctr">
             <a:noAutofit/>
           </a:bodyPr>
           <a:lstStyle/>
@@ -7453,13 +7166,13 @@
   <p:clrMapOvr>
     <a:masterClrMapping/>
   </p:clrMapOvr>
-  <mc:AlternateContent xmlns:mc="http://schemas.openxmlformats.org/markup-compatibility/2006">
-    <mc:Choice xmlns:p14="http://schemas.microsoft.com/office/powerpoint/2010/main" Requires="p14">
+  <mc:AlternateContent xmlns:mc="http://schemas.openxmlformats.org/markup-compatibility/2006" xmlns:p14="http://schemas.microsoft.com/office/powerpoint/2010/main">
+    <mc:Choice Requires="p14">
       <p:transition spd="med" p14:dur="700">
         <p:fade/>
       </p:transition>
     </mc:Choice>
-    <mc:Fallback>
+    <mc:Fallback xmlns="">
       <p:transition spd="med">
         <p:fade/>
       </p:transition>
@@ -7504,11 +7217,11 @@
         <p:spPr>
           <a:xfrm>
             <a:off x="677334" y="106680"/>
-            <a:ext cx="8596668" cy="1320800"/>
+            <a:ext cx="8596668" cy="1026160"/>
           </a:xfrm>
         </p:spPr>
         <p:txBody>
-          <a:bodyPr/>
+          <a:bodyPr anchor="ctr"/>
           <a:lstStyle/>
           <a:p>
             <a:r>
@@ -7541,7 +7254,7 @@
           </a:xfrm>
         </p:spPr>
         <p:txBody>
-          <a:bodyPr>
+          <a:bodyPr anchor="ctr">
             <a:noAutofit/>
           </a:bodyPr>
           <a:lstStyle/>
@@ -7735,13 +7448,13 @@
   <p:clrMapOvr>
     <a:masterClrMapping/>
   </p:clrMapOvr>
-  <mc:AlternateContent xmlns:mc="http://schemas.openxmlformats.org/markup-compatibility/2006">
-    <mc:Choice xmlns:p14="http://schemas.microsoft.com/office/powerpoint/2010/main" Requires="p14">
+  <mc:AlternateContent xmlns:mc="http://schemas.openxmlformats.org/markup-compatibility/2006" xmlns:p14="http://schemas.microsoft.com/office/powerpoint/2010/main">
+    <mc:Choice Requires="p14">
       <p:transition spd="med" p14:dur="700">
         <p:fade/>
       </p:transition>
     </mc:Choice>
-    <mc:Fallback>
+    <mc:Fallback xmlns="">
       <p:transition spd="med">
         <p:fade/>
       </p:transition>
@@ -7898,13 +7611,13 @@
   <p:clrMapOvr>
     <a:masterClrMapping/>
   </p:clrMapOvr>
-  <mc:AlternateContent xmlns:mc="http://schemas.openxmlformats.org/markup-compatibility/2006">
-    <mc:Choice xmlns:p14="http://schemas.microsoft.com/office/powerpoint/2010/main" Requires="p14">
+  <mc:AlternateContent xmlns:mc="http://schemas.openxmlformats.org/markup-compatibility/2006" xmlns:p14="http://schemas.microsoft.com/office/powerpoint/2010/main">
+    <mc:Choice Requires="p14">
       <p:transition spd="med" p14:dur="700">
         <p:fade/>
       </p:transition>
     </mc:Choice>
-    <mc:Fallback>
+    <mc:Fallback xmlns="">
       <p:transition spd="med">
         <p:fade/>
       </p:transition>
@@ -8113,13 +7826,13 @@
   <p:clrMapOvr>
     <a:masterClrMapping/>
   </p:clrMapOvr>
-  <mc:AlternateContent xmlns:mc="http://schemas.openxmlformats.org/markup-compatibility/2006">
-    <mc:Choice xmlns:p14="http://schemas.microsoft.com/office/powerpoint/2010/main" Requires="p14">
+  <mc:AlternateContent xmlns:mc="http://schemas.openxmlformats.org/markup-compatibility/2006" xmlns:p14="http://schemas.microsoft.com/office/powerpoint/2010/main">
+    <mc:Choice Requires="p14">
       <p:transition spd="med" p14:dur="700">
         <p:fade/>
       </p:transition>
     </mc:Choice>
-    <mc:Fallback>
+    <mc:Fallback xmlns="">
       <p:transition spd="med">
         <p:fade/>
       </p:transition>
@@ -8507,13 +8220,13 @@
   <p:clrMapOvr>
     <a:masterClrMapping/>
   </p:clrMapOvr>
-  <mc:AlternateContent xmlns:mc="http://schemas.openxmlformats.org/markup-compatibility/2006">
-    <mc:Choice xmlns:p14="http://schemas.microsoft.com/office/powerpoint/2010/main" Requires="p14">
+  <mc:AlternateContent xmlns:mc="http://schemas.openxmlformats.org/markup-compatibility/2006" xmlns:p14="http://schemas.microsoft.com/office/powerpoint/2010/main">
+    <mc:Choice Requires="p14">
       <p:transition spd="med" p14:dur="700">
         <p:fade/>
       </p:transition>
     </mc:Choice>
-    <mc:Fallback>
+    <mc:Fallback xmlns="">
       <p:transition spd="med">
         <p:fade/>
       </p:transition>
@@ -8717,13 +8430,13 @@
   <p:clrMapOvr>
     <a:masterClrMapping/>
   </p:clrMapOvr>
-  <mc:AlternateContent xmlns:mc="http://schemas.openxmlformats.org/markup-compatibility/2006">
-    <mc:Choice xmlns:p14="http://schemas.microsoft.com/office/powerpoint/2010/main" Requires="p14">
+  <mc:AlternateContent xmlns:mc="http://schemas.openxmlformats.org/markup-compatibility/2006" xmlns:p14="http://schemas.microsoft.com/office/powerpoint/2010/main">
+    <mc:Choice Requires="p14">
       <p:transition spd="med" p14:dur="700">
         <p:fade/>
       </p:transition>
     </mc:Choice>
-    <mc:Fallback>
+    <mc:Fallback xmlns="">
       <p:transition spd="med">
         <p:fade/>
       </p:transition>
@@ -8804,13 +8517,13 @@
   <p:clrMapOvr>
     <a:masterClrMapping/>
   </p:clrMapOvr>
-  <mc:AlternateContent xmlns:mc="http://schemas.openxmlformats.org/markup-compatibility/2006">
-    <mc:Choice xmlns:p14="http://schemas.microsoft.com/office/powerpoint/2010/main" Requires="p14">
+  <mc:AlternateContent xmlns:mc="http://schemas.openxmlformats.org/markup-compatibility/2006" xmlns:p14="http://schemas.microsoft.com/office/powerpoint/2010/main">
+    <mc:Choice Requires="p14">
       <p:transition spd="med" p14:dur="700">
         <p:fade/>
       </p:transition>
     </mc:Choice>
-    <mc:Fallback>
+    <mc:Fallback xmlns="">
       <p:transition spd="med">
         <p:fade/>
       </p:transition>
@@ -8859,7 +8572,7 @@
           </a:xfrm>
         </p:spPr>
         <p:txBody>
-          <a:bodyPr/>
+          <a:bodyPr anchor="ctr"/>
           <a:lstStyle/>
           <a:p>
             <a:pPr algn="ctr"/>
@@ -8924,7 +8637,12 @@
             <a:fillRect/>
           </a:stretch>
         </p:blipFill>
-        <p:spPr/>
+        <p:spPr>
+          <a:xfrm>
+            <a:off x="677334" y="314960"/>
+            <a:ext cx="8596668" cy="3845718"/>
+          </a:xfrm>
+        </p:spPr>
       </p:pic>
       <p:sp>
         <p:nvSpPr>
@@ -8949,7 +8667,7 @@
           </a:xfrm>
         </p:spPr>
         <p:txBody>
-          <a:bodyPr>
+          <a:bodyPr anchor="ctr">
             <a:normAutofit lnSpcReduction="10000"/>
           </a:bodyPr>
           <a:lstStyle/>
@@ -9247,13 +8965,13 @@
   <p:clrMapOvr>
     <a:masterClrMapping/>
   </p:clrMapOvr>
-  <mc:AlternateContent xmlns:mc="http://schemas.openxmlformats.org/markup-compatibility/2006">
-    <mc:Choice xmlns:p14="http://schemas.microsoft.com/office/powerpoint/2010/main" Requires="p14">
+  <mc:AlternateContent xmlns:mc="http://schemas.openxmlformats.org/markup-compatibility/2006" xmlns:p14="http://schemas.microsoft.com/office/powerpoint/2010/main">
+    <mc:Choice Requires="p14">
       <p:transition spd="med" p14:dur="700">
         <p:fade/>
       </p:transition>
     </mc:Choice>
-    <mc:Fallback>
+    <mc:Fallback xmlns="">
       <p:transition spd="med">
         <p:fade/>
       </p:transition>
@@ -9617,13 +9335,13 @@
   <p:clrMapOvr>
     <a:masterClrMapping/>
   </p:clrMapOvr>
-  <mc:AlternateContent xmlns:mc="http://schemas.openxmlformats.org/markup-compatibility/2006">
-    <mc:Choice xmlns:p14="http://schemas.microsoft.com/office/powerpoint/2010/main" Requires="p14">
+  <mc:AlternateContent xmlns:mc="http://schemas.openxmlformats.org/markup-compatibility/2006" xmlns:p14="http://schemas.microsoft.com/office/powerpoint/2010/main">
+    <mc:Choice Requires="p14">
       <p:transition spd="med" p14:dur="700">
         <p:fade/>
       </p:transition>
     </mc:Choice>
-    <mc:Fallback>
+    <mc:Fallback xmlns="">
       <p:transition spd="med">
         <p:fade/>
       </p:transition>

</xml_diff>